<commit_message>
Update noc route figure
</commit_message>
<xml_diff>
--- a/figure/noc_routes.pptx
+++ b/figure/noc_routes.pptx
@@ -1012,7 +1012,7 @@
           <a:p>
             <a:fld id="{E90ED720-0104-4369-84BC-D37694168613}" type="datetimeFigureOut">
               <a:rPr kumimoji="1" lang="ja-JP" altLang="en-US" smtClean="0"/>
-              <a:t>2017/6/2</a:t>
+              <a:t>2017/9/27</a:t>
             </a:fld>
             <a:endParaRPr kumimoji="1" lang="ja-JP" altLang="en-US"/>
           </a:p>
@@ -1214,7 +1214,7 @@
           <a:p>
             <a:fld id="{E90ED720-0104-4369-84BC-D37694168613}" type="datetimeFigureOut">
               <a:rPr kumimoji="1" lang="ja-JP" altLang="en-US" smtClean="0"/>
-              <a:t>2017/6/2</a:t>
+              <a:t>2017/9/27</a:t>
             </a:fld>
             <a:endParaRPr kumimoji="1" lang="ja-JP" altLang="en-US"/>
           </a:p>
@@ -1426,7 +1426,7 @@
           <a:p>
             <a:fld id="{E90ED720-0104-4369-84BC-D37694168613}" type="datetimeFigureOut">
               <a:rPr kumimoji="1" lang="ja-JP" altLang="en-US" smtClean="0"/>
-              <a:t>2017/6/2</a:t>
+              <a:t>2017/9/27</a:t>
             </a:fld>
             <a:endParaRPr kumimoji="1" lang="ja-JP" altLang="en-US"/>
           </a:p>
@@ -1628,7 +1628,7 @@
           <a:p>
             <a:fld id="{E90ED720-0104-4369-84BC-D37694168613}" type="datetimeFigureOut">
               <a:rPr kumimoji="1" lang="ja-JP" altLang="en-US" smtClean="0"/>
-              <a:t>2017/6/2</a:t>
+              <a:t>2017/9/27</a:t>
             </a:fld>
             <a:endParaRPr kumimoji="1" lang="ja-JP" altLang="en-US"/>
           </a:p>
@@ -1874,7 +1874,7 @@
           <a:p>
             <a:fld id="{E90ED720-0104-4369-84BC-D37694168613}" type="datetimeFigureOut">
               <a:rPr kumimoji="1" lang="ja-JP" altLang="en-US" smtClean="0"/>
-              <a:t>2017/6/2</a:t>
+              <a:t>2017/9/27</a:t>
             </a:fld>
             <a:endParaRPr kumimoji="1" lang="ja-JP" altLang="en-US"/>
           </a:p>
@@ -2226,7 +2226,7 @@
           <a:p>
             <a:fld id="{E90ED720-0104-4369-84BC-D37694168613}" type="datetimeFigureOut">
               <a:rPr kumimoji="1" lang="ja-JP" altLang="en-US" smtClean="0"/>
-              <a:t>2017/6/2</a:t>
+              <a:t>2017/9/27</a:t>
             </a:fld>
             <a:endParaRPr kumimoji="1" lang="ja-JP" altLang="en-US"/>
           </a:p>
@@ -2712,7 +2712,7 @@
           <a:p>
             <a:fld id="{E90ED720-0104-4369-84BC-D37694168613}" type="datetimeFigureOut">
               <a:rPr kumimoji="1" lang="ja-JP" altLang="en-US" smtClean="0"/>
-              <a:t>2017/6/2</a:t>
+              <a:t>2017/9/27</a:t>
             </a:fld>
             <a:endParaRPr kumimoji="1" lang="ja-JP" altLang="en-US"/>
           </a:p>
@@ -2830,7 +2830,7 @@
           <a:p>
             <a:fld id="{E90ED720-0104-4369-84BC-D37694168613}" type="datetimeFigureOut">
               <a:rPr kumimoji="1" lang="ja-JP" altLang="en-US" smtClean="0"/>
-              <a:t>2017/6/2</a:t>
+              <a:t>2017/9/27</a:t>
             </a:fld>
             <a:endParaRPr kumimoji="1" lang="ja-JP" altLang="en-US"/>
           </a:p>
@@ -2925,7 +2925,7 @@
           <a:p>
             <a:fld id="{E90ED720-0104-4369-84BC-D37694168613}" type="datetimeFigureOut">
               <a:rPr kumimoji="1" lang="ja-JP" altLang="en-US" smtClean="0"/>
-              <a:t>2017/6/2</a:t>
+              <a:t>2017/9/27</a:t>
             </a:fld>
             <a:endParaRPr kumimoji="1" lang="ja-JP" altLang="en-US"/>
           </a:p>
@@ -3234,7 +3234,7 @@
           <a:p>
             <a:fld id="{E90ED720-0104-4369-84BC-D37694168613}" type="datetimeFigureOut">
               <a:rPr kumimoji="1" lang="ja-JP" altLang="en-US" smtClean="0"/>
-              <a:t>2017/6/2</a:t>
+              <a:t>2017/9/27</a:t>
             </a:fld>
             <a:endParaRPr kumimoji="1" lang="ja-JP" altLang="en-US"/>
           </a:p>
@@ -3487,7 +3487,7 @@
           <a:p>
             <a:fld id="{E90ED720-0104-4369-84BC-D37694168613}" type="datetimeFigureOut">
               <a:rPr kumimoji="1" lang="ja-JP" altLang="en-US" smtClean="0"/>
-              <a:t>2017/6/2</a:t>
+              <a:t>2017/9/27</a:t>
             </a:fld>
             <a:endParaRPr kumimoji="1" lang="ja-JP" altLang="en-US"/>
           </a:p>
@@ -3732,7 +3732,7 @@
           <a:p>
             <a:fld id="{E90ED720-0104-4369-84BC-D37694168613}" type="datetimeFigureOut">
               <a:rPr kumimoji="1" lang="ja-JP" altLang="en-US" smtClean="0"/>
-              <a:t>2017/6/2</a:t>
+              <a:t>2017/9/27</a:t>
             </a:fld>
             <a:endParaRPr kumimoji="1" lang="ja-JP" altLang="en-US"/>
           </a:p>
@@ -5942,11 +5942,7 @@
               <a:prstGeom prst="ellipse">
                 <a:avLst/>
               </a:prstGeom>
-              <a:solidFill>
-                <a:schemeClr val="bg1">
-                  <a:lumMod val="85000"/>
-                </a:schemeClr>
-              </a:solidFill>
+              <a:noFill/>
               <a:ln w="12700">
                 <a:solidFill>
                   <a:schemeClr val="tx1"/>

</xml_diff>